<commit_message>
Patch des return & indentation du composer.json
</commit_message>
<xml_diff>
--- a/présentation/Blog.pptx
+++ b/présentation/Blog.pptx
@@ -6815,7 +6815,7 @@
           <a:p>
             <a:fld id="{BD8D4335-CDFD-4A79-8CA6-3C90FF6AC477}" type="datetimeFigureOut">
               <a:rPr lang="fr-FR" smtClean="0"/>
-              <a:t>23/11/2021</a:t>
+              <a:t>27/11/2021</a:t>
             </a:fld>
             <a:endParaRPr lang="fr-FR"/>
           </a:p>
@@ -7013,7 +7013,7 @@
           <a:p>
             <a:fld id="{BD8D4335-CDFD-4A79-8CA6-3C90FF6AC477}" type="datetimeFigureOut">
               <a:rPr lang="fr-FR" smtClean="0"/>
-              <a:t>23/11/2021</a:t>
+              <a:t>27/11/2021</a:t>
             </a:fld>
             <a:endParaRPr lang="fr-FR"/>
           </a:p>
@@ -7221,7 +7221,7 @@
           <a:p>
             <a:fld id="{BD8D4335-CDFD-4A79-8CA6-3C90FF6AC477}" type="datetimeFigureOut">
               <a:rPr lang="fr-FR" smtClean="0"/>
-              <a:t>23/11/2021</a:t>
+              <a:t>27/11/2021</a:t>
             </a:fld>
             <a:endParaRPr lang="fr-FR"/>
           </a:p>
@@ -7419,7 +7419,7 @@
           <a:p>
             <a:fld id="{BD8D4335-CDFD-4A79-8CA6-3C90FF6AC477}" type="datetimeFigureOut">
               <a:rPr lang="fr-FR" smtClean="0"/>
-              <a:t>23/11/2021</a:t>
+              <a:t>27/11/2021</a:t>
             </a:fld>
             <a:endParaRPr lang="fr-FR"/>
           </a:p>
@@ -7694,7 +7694,7 @@
           <a:p>
             <a:fld id="{BD8D4335-CDFD-4A79-8CA6-3C90FF6AC477}" type="datetimeFigureOut">
               <a:rPr lang="fr-FR" smtClean="0"/>
-              <a:t>23/11/2021</a:t>
+              <a:t>27/11/2021</a:t>
             </a:fld>
             <a:endParaRPr lang="fr-FR"/>
           </a:p>
@@ -7959,7 +7959,7 @@
           <a:p>
             <a:fld id="{BD8D4335-CDFD-4A79-8CA6-3C90FF6AC477}" type="datetimeFigureOut">
               <a:rPr lang="fr-FR" smtClean="0"/>
-              <a:t>23/11/2021</a:t>
+              <a:t>27/11/2021</a:t>
             </a:fld>
             <a:endParaRPr lang="fr-FR"/>
           </a:p>
@@ -8371,7 +8371,7 @@
           <a:p>
             <a:fld id="{BD8D4335-CDFD-4A79-8CA6-3C90FF6AC477}" type="datetimeFigureOut">
               <a:rPr lang="fr-FR" smtClean="0"/>
-              <a:t>23/11/2021</a:t>
+              <a:t>27/11/2021</a:t>
             </a:fld>
             <a:endParaRPr lang="fr-FR"/>
           </a:p>
@@ -8512,7 +8512,7 @@
           <a:p>
             <a:fld id="{BD8D4335-CDFD-4A79-8CA6-3C90FF6AC477}" type="datetimeFigureOut">
               <a:rPr lang="fr-FR" smtClean="0"/>
-              <a:t>23/11/2021</a:t>
+              <a:t>27/11/2021</a:t>
             </a:fld>
             <a:endParaRPr lang="fr-FR"/>
           </a:p>
@@ -8625,7 +8625,7 @@
           <a:p>
             <a:fld id="{BD8D4335-CDFD-4A79-8CA6-3C90FF6AC477}" type="datetimeFigureOut">
               <a:rPr lang="fr-FR" smtClean="0"/>
-              <a:t>23/11/2021</a:t>
+              <a:t>27/11/2021</a:t>
             </a:fld>
             <a:endParaRPr lang="fr-FR"/>
           </a:p>
@@ -8936,7 +8936,7 @@
           <a:p>
             <a:fld id="{BD8D4335-CDFD-4A79-8CA6-3C90FF6AC477}" type="datetimeFigureOut">
               <a:rPr lang="fr-FR" smtClean="0"/>
-              <a:t>23/11/2021</a:t>
+              <a:t>27/11/2021</a:t>
             </a:fld>
             <a:endParaRPr lang="fr-FR"/>
           </a:p>
@@ -9224,7 +9224,7 @@
           <a:p>
             <a:fld id="{BD8D4335-CDFD-4A79-8CA6-3C90FF6AC477}" type="datetimeFigureOut">
               <a:rPr lang="fr-FR" smtClean="0"/>
-              <a:t>23/11/2021</a:t>
+              <a:t>27/11/2021</a:t>
             </a:fld>
             <a:endParaRPr lang="fr-FR"/>
           </a:p>
@@ -9465,7 +9465,7 @@
           <a:p>
             <a:fld id="{BD8D4335-CDFD-4A79-8CA6-3C90FF6AC477}" type="datetimeFigureOut">
               <a:rPr lang="fr-FR" smtClean="0"/>
-              <a:t>23/11/2021</a:t>
+              <a:t>27/11/2021</a:t>
             </a:fld>
             <a:endParaRPr lang="fr-FR"/>
           </a:p>
@@ -14410,10 +14410,9 @@
               <a:buChar char="•"/>
             </a:pPr>
             <a:r>
-              <a:rPr lang="fr-FR" dirty="0" err="1"/>
-              <a:t>Jquery</a:t>
+              <a:rPr lang="fr-FR" dirty="0"/>
+              <a:t>jQuery</a:t>
             </a:r>
-            <a:endParaRPr lang="fr-FR" dirty="0"/>
           </a:p>
           <a:p>
             <a:pPr marL="742950" lvl="1" indent="-285750">

</xml_diff>